<commit_message>
Refactor to use clustered_network; fix bug related to max_num_perm
</commit_message>
<xml_diff>
--- a/docs/sirn_figures.pptx
+++ b/docs/sirn_figures.pptx
@@ -30778,11 +30778,7 @@
           <a:p>
             <a:r>
               <a:rPr lang="en-US" dirty="0"/>
-              <a:t>Need for threshold on maximum number </a:t>
-            </a:r>
-            <a:r>
-              <a:rPr lang="en-US"/>
-              <a:t>of permutations</a:t>
+              <a:t>Need for threshold on maximum number of permutations</a:t>
             </a:r>
           </a:p>
         </p:txBody>

</xml_diff>